<commit_message>
renamed hands-on document to be shorter
</commit_message>
<xml_diff>
--- a/ModificationFreeExtensibilityAdaptationProject.pptx
+++ b/ModificationFreeExtensibilityAdaptationProject.pptx
@@ -14340,19 +14340,36 @@
                 </a:solidFill>
                 <a:latin typeface="Verdana"/>
               </a:rPr>
-              <a:t>Get the Hands-On document: </a:t>
+              <a:t>Get the </a:t>
             </a:r>
             <a:r>
-              <a:rPr lang="en-US" sz="1600" dirty="0">
+              <a:rPr lang="en-US" sz="1600">
+                <a:solidFill>
+                  <a:srgbClr val="FFFFFF"/>
+                </a:solidFill>
+                <a:latin typeface="Verdana"/>
+              </a:rPr>
+              <a:t>Hands-On </a:t>
+            </a:r>
+            <a:r>
+              <a:rPr lang="en-US" sz="1600">
+                <a:solidFill>
+                  <a:srgbClr val="FFFFFF"/>
+                </a:solidFill>
+              </a:rPr>
+              <a:t>document : </a:t>
+            </a:r>
+            <a:r>
+              <a:rPr lang="en-US" sz="1600">
                 <a:solidFill>
                   <a:srgbClr val="FFFFFF"/>
                 </a:solidFill>
                 <a:hlinkClick r:id="rId3"/>
               </a:rPr>
-              <a:t>https://swennemers.github.io/ModificationFreeExtensibilityAdaptationProject.docx</a:t>
+              <a:t>https://swennemers.github.io/handson.docx</a:t>
             </a:r>
             <a:r>
-              <a:rPr lang="en-US" sz="1600" dirty="0">
+              <a:rPr lang="en-US" sz="1600">
                 <a:solidFill>
                   <a:srgbClr val="FFFFFF"/>
                 </a:solidFill>
@@ -24744,12 +24761,9 @@
 </file>
 
 <file path=customXml/item1.xml><?xml version="1.0" encoding="utf-8"?>
-<?mso-contentType ?>
-<FormTemplates xmlns="http://schemas.microsoft.com/sharepoint/v3/contenttype/forms">
-  <Display>DocumentLibraryForm</Display>
-  <Edit>DocumentLibraryForm</Edit>
-  <New>DocumentLibraryForm</New>
-</FormTemplates>
+<p:properties xmlns:p="http://schemas.microsoft.com/office/2006/metadata/properties" xmlns:xsi="http://www.w3.org/2001/XMLSchema-instance" xmlns:pc="http://schemas.microsoft.com/office/infopath/2007/PartnerControls">
+  <documentManagement/>
+</p:properties>
 </file>
 
 <file path=customXml/item2.xml><?xml version="1.0" encoding="utf-8"?>
@@ -24891,15 +24905,26 @@
 </file>
 
 <file path=customXml/item3.xml><?xml version="1.0" encoding="utf-8"?>
-<p:properties xmlns:p="http://schemas.microsoft.com/office/2006/metadata/properties" xmlns:xsi="http://www.w3.org/2001/XMLSchema-instance" xmlns:pc="http://schemas.microsoft.com/office/infopath/2007/PartnerControls">
-  <documentManagement/>
-</p:properties>
+<?mso-contentType ?>
+<FormTemplates xmlns="http://schemas.microsoft.com/sharepoint/v3/contenttype/forms">
+  <Display>DocumentLibraryForm</Display>
+  <Edit>DocumentLibraryForm</Edit>
+  <New>DocumentLibraryForm</New>
+</FormTemplates>
 </file>
 
 <file path=customXml/itemProps1.xml><?xml version="1.0" encoding="utf-8"?>
-<ds:datastoreItem xmlns:ds="http://schemas.openxmlformats.org/officeDocument/2006/customXml" ds:itemID="{F5C704F8-E492-4D0C-B57C-F66B10524C56}">
+<ds:datastoreItem xmlns:ds="http://schemas.openxmlformats.org/officeDocument/2006/customXml" ds:itemID="{44AA3C33-C817-4C29-B68E-48FE50772B54}">
   <ds:schemaRefs>
-    <ds:schemaRef ds:uri="http://schemas.microsoft.com/sharepoint/v3/contenttype/forms"/>
+    <ds:schemaRef ds:uri="cf03c0ce-6c1e-4182-97c7-0c3b398a3c19"/>
+    <ds:schemaRef ds:uri="http://purl.org/dc/terms/"/>
+    <ds:schemaRef ds:uri="http://schemas.openxmlformats.org/package/2006/metadata/core-properties"/>
+    <ds:schemaRef ds:uri="http://schemas.microsoft.com/office/2006/documentManagement/types"/>
+    <ds:schemaRef ds:uri="http://schemas.microsoft.com/office/infopath/2007/PartnerControls"/>
+    <ds:schemaRef ds:uri="http://purl.org/dc/elements/1.1/"/>
+    <ds:schemaRef ds:uri="http://schemas.microsoft.com/office/2006/metadata/properties"/>
+    <ds:schemaRef ds:uri="http://www.w3.org/XML/1998/namespace"/>
+    <ds:schemaRef ds:uri="http://purl.org/dc/dcmitype/"/>
   </ds:schemaRefs>
 </ds:datastoreItem>
 </file>
@@ -24923,17 +24948,9 @@
 </file>
 
 <file path=customXml/itemProps3.xml><?xml version="1.0" encoding="utf-8"?>
-<ds:datastoreItem xmlns:ds="http://schemas.openxmlformats.org/officeDocument/2006/customXml" ds:itemID="{44AA3C33-C817-4C29-B68E-48FE50772B54}">
+<ds:datastoreItem xmlns:ds="http://schemas.openxmlformats.org/officeDocument/2006/customXml" ds:itemID="{F5C704F8-E492-4D0C-B57C-F66B10524C56}">
   <ds:schemaRefs>
-    <ds:schemaRef ds:uri="cf03c0ce-6c1e-4182-97c7-0c3b398a3c19"/>
-    <ds:schemaRef ds:uri="http://purl.org/dc/terms/"/>
-    <ds:schemaRef ds:uri="http://schemas.openxmlformats.org/package/2006/metadata/core-properties"/>
-    <ds:schemaRef ds:uri="http://schemas.microsoft.com/office/2006/documentManagement/types"/>
-    <ds:schemaRef ds:uri="http://schemas.microsoft.com/office/infopath/2007/PartnerControls"/>
-    <ds:schemaRef ds:uri="http://purl.org/dc/elements/1.1/"/>
-    <ds:schemaRef ds:uri="http://schemas.microsoft.com/office/2006/metadata/properties"/>
-    <ds:schemaRef ds:uri="http://www.w3.org/XML/1998/namespace"/>
-    <ds:schemaRef ds:uri="http://purl.org/dc/dcmitype/"/>
+    <ds:schemaRef ds:uri="http://schemas.microsoft.com/sharepoint/v3/contenttype/forms"/>
   </ds:schemaRefs>
 </ds:datastoreItem>
 </file>
</xml_diff>